<commit_message>
fix: fix info about HMD
</commit_message>
<xml_diff>
--- a/unidade_1/Slides-trab-unidade-1.pptx
+++ b/unidade_1/Slides-trab-unidade-1.pptx
@@ -3013,7 +3013,7 @@
             <a:fld id="{B61BEF0D-F0BB-DE4B-95CE-6DB70DBA9567}" type="datetimeFigureOut">
               <a:rPr lang="en-US" smtClean="0"/>
               <a:pPr/>
-              <a:t>8/13/2022</a:t>
+              <a:t>8/15/2022</a:t>
             </a:fld>
             <a:endParaRPr lang="en-US" dirty="0"/>
           </a:p>
@@ -3349,7 +3349,7 @@
             <a:fld id="{B61BEF0D-F0BB-DE4B-95CE-6DB70DBA9567}" type="datetimeFigureOut">
               <a:rPr lang="en-US" smtClean="0"/>
               <a:pPr/>
-              <a:t>8/13/2022</a:t>
+              <a:t>8/15/2022</a:t>
             </a:fld>
             <a:endParaRPr lang="en-US" dirty="0"/>
           </a:p>
@@ -3629,7 +3629,7 @@
             <a:fld id="{B61BEF0D-F0BB-DE4B-95CE-6DB70DBA9567}" type="datetimeFigureOut">
               <a:rPr lang="en-US" smtClean="0"/>
               <a:pPr/>
-              <a:t>8/13/2022</a:t>
+              <a:t>8/15/2022</a:t>
             </a:fld>
             <a:endParaRPr lang="en-US" dirty="0"/>
           </a:p>
@@ -4199,7 +4199,7 @@
             <a:fld id="{B61BEF0D-F0BB-DE4B-95CE-6DB70DBA9567}" type="datetimeFigureOut">
               <a:rPr lang="en-US" smtClean="0"/>
               <a:pPr/>
-              <a:t>8/13/2022</a:t>
+              <a:t>8/15/2022</a:t>
             </a:fld>
             <a:endParaRPr lang="en-US" dirty="0"/>
           </a:p>
@@ -4479,7 +4479,7 @@
             <a:fld id="{B61BEF0D-F0BB-DE4B-95CE-6DB70DBA9567}" type="datetimeFigureOut">
               <a:rPr lang="en-US" smtClean="0"/>
               <a:pPr/>
-              <a:t>8/13/2022</a:t>
+              <a:t>8/15/2022</a:t>
             </a:fld>
             <a:endParaRPr lang="en-US" dirty="0"/>
           </a:p>
@@ -5043,7 +5043,7 @@
             <a:fld id="{B61BEF0D-F0BB-DE4B-95CE-6DB70DBA9567}" type="datetimeFigureOut">
               <a:rPr lang="en-US" smtClean="0"/>
               <a:pPr/>
-              <a:t>8/13/2022</a:t>
+              <a:t>8/15/2022</a:t>
             </a:fld>
             <a:endParaRPr lang="en-US" dirty="0"/>
           </a:p>
@@ -5372,7 +5372,7 @@
             <a:fld id="{B61BEF0D-F0BB-DE4B-95CE-6DB70DBA9567}" type="datetimeFigureOut">
               <a:rPr lang="en-US" smtClean="0"/>
               <a:pPr/>
-              <a:t>8/13/2022</a:t>
+              <a:t>8/15/2022</a:t>
             </a:fld>
             <a:endParaRPr lang="en-US" dirty="0"/>
           </a:p>
@@ -5551,7 +5551,7 @@
             <a:fld id="{B61BEF0D-F0BB-DE4B-95CE-6DB70DBA9567}" type="datetimeFigureOut">
               <a:rPr lang="en-US" smtClean="0"/>
               <a:pPr/>
-              <a:t>8/13/2022</a:t>
+              <a:t>8/15/2022</a:t>
             </a:fld>
             <a:endParaRPr lang="en-US" dirty="0"/>
           </a:p>
@@ -5791,7 +5791,7 @@
             <a:fld id="{B61BEF0D-F0BB-DE4B-95CE-6DB70DBA9567}" type="datetimeFigureOut">
               <a:rPr lang="en-US" smtClean="0"/>
               <a:pPr/>
-              <a:t>8/13/2022</a:t>
+              <a:t>8/15/2022</a:t>
             </a:fld>
             <a:endParaRPr lang="en-US" dirty="0"/>
           </a:p>
@@ -5993,7 +5993,7 @@
             <a:fld id="{B61BEF0D-F0BB-DE4B-95CE-6DB70DBA9567}" type="datetimeFigureOut">
               <a:rPr lang="en-US" smtClean="0"/>
               <a:pPr/>
-              <a:t>8/13/2022</a:t>
+              <a:t>8/15/2022</a:t>
             </a:fld>
             <a:endParaRPr lang="en-US" dirty="0"/>
           </a:p>
@@ -6271,7 +6271,7 @@
             <a:fld id="{B61BEF0D-F0BB-DE4B-95CE-6DB70DBA9567}" type="datetimeFigureOut">
               <a:rPr lang="en-US" smtClean="0"/>
               <a:pPr/>
-              <a:t>8/13/2022</a:t>
+              <a:t>8/15/2022</a:t>
             </a:fld>
             <a:endParaRPr lang="en-US" dirty="0"/>
           </a:p>
@@ -6539,7 +6539,7 @@
             <a:fld id="{B61BEF0D-F0BB-DE4B-95CE-6DB70DBA9567}" type="datetimeFigureOut">
               <a:rPr lang="en-US" smtClean="0"/>
               <a:pPr/>
-              <a:t>8/13/2022</a:t>
+              <a:t>8/15/2022</a:t>
             </a:fld>
             <a:endParaRPr lang="en-US" dirty="0"/>
           </a:p>
@@ -6915,7 +6915,7 @@
             <a:fld id="{B61BEF0D-F0BB-DE4B-95CE-6DB70DBA9567}" type="datetimeFigureOut">
               <a:rPr lang="en-US" smtClean="0"/>
               <a:pPr/>
-              <a:t>8/13/2022</a:t>
+              <a:t>8/15/2022</a:t>
             </a:fld>
             <a:endParaRPr lang="en-US" dirty="0"/>
           </a:p>
@@ -7065,7 +7065,7 @@
             <a:fld id="{B61BEF0D-F0BB-DE4B-95CE-6DB70DBA9567}" type="datetimeFigureOut">
               <a:rPr lang="en-US" smtClean="0"/>
               <a:pPr/>
-              <a:t>8/13/2022</a:t>
+              <a:t>8/15/2022</a:t>
             </a:fld>
             <a:endParaRPr lang="en-US" dirty="0"/>
           </a:p>
@@ -7192,7 +7192,7 @@
             <a:fld id="{B61BEF0D-F0BB-DE4B-95CE-6DB70DBA9567}" type="datetimeFigureOut">
               <a:rPr lang="en-US" smtClean="0"/>
               <a:pPr/>
-              <a:t>8/13/2022</a:t>
+              <a:t>8/15/2022</a:t>
             </a:fld>
             <a:endParaRPr lang="en-US" dirty="0"/>
           </a:p>
@@ -7479,7 +7479,7 @@
             <a:fld id="{B61BEF0D-F0BB-DE4B-95CE-6DB70DBA9567}" type="datetimeFigureOut">
               <a:rPr lang="en-US" smtClean="0"/>
               <a:pPr/>
-              <a:t>8/13/2022</a:t>
+              <a:t>8/15/2022</a:t>
             </a:fld>
             <a:endParaRPr lang="en-US" dirty="0"/>
           </a:p>
@@ -7805,7 +7805,7 @@
             <a:fld id="{B61BEF0D-F0BB-DE4B-95CE-6DB70DBA9567}" type="datetimeFigureOut">
               <a:rPr lang="en-US" smtClean="0"/>
               <a:pPr/>
-              <a:t>8/13/2022</a:t>
+              <a:t>8/15/2022</a:t>
             </a:fld>
             <a:endParaRPr lang="en-US" dirty="0"/>
           </a:p>
@@ -8021,7 +8021,7 @@
             <a:fld id="{B61BEF0D-F0BB-DE4B-95CE-6DB70DBA9567}" type="datetimeFigureOut">
               <a:rPr lang="en-US" smtClean="0"/>
               <a:pPr/>
-              <a:t>8/13/2022</a:t>
+              <a:t>8/15/2022</a:t>
             </a:fld>
             <a:endParaRPr lang="en-US" dirty="0"/>
           </a:p>
@@ -25327,7 +25327,15 @@
           <a:p>
             <a:r>
               <a:rPr lang="pt-BR" sz="1800" dirty="0"/>
-              <a:t>Primeiro capacete de Realidade Virtual de 1997.</a:t>
+              <a:t>Primeiro capacete de Realidade Virtual </a:t>
+            </a:r>
+            <a:r>
+              <a:rPr lang="pt-BR" sz="1800"/>
+              <a:t>de 1967</a:t>
+            </a:r>
+            <a:r>
+              <a:rPr lang="pt-BR" sz="1800" dirty="0"/>
+              <a:t>.</a:t>
             </a:r>
           </a:p>
         </p:txBody>
@@ -25646,12 +25654,9 @@
 </file>
 
 <file path=customXml/item1.xml><?xml version="1.0" encoding="utf-8"?>
-<?mso-contentType ?>
-<FormTemplates xmlns="http://schemas.microsoft.com/sharepoint/v3/contenttype/forms">
-  <Display>DocumentLibraryForm</Display>
-  <Edit>DocumentLibraryForm</Edit>
-  <New>DocumentLibraryForm</New>
-</FormTemplates>
+<p:properties xmlns:p="http://schemas.microsoft.com/office/2006/metadata/properties" xmlns:xsi="http://www.w3.org/2001/XMLSchema-instance" xmlns:pc="http://schemas.microsoft.com/office/infopath/2007/PartnerControls">
+  <documentManagement/>
+</p:properties>
 </file>
 
 <file path=customXml/item2.xml><?xml version="1.0" encoding="utf-8"?>
@@ -25864,15 +25869,27 @@
 </file>
 
 <file path=customXml/item3.xml><?xml version="1.0" encoding="utf-8"?>
-<p:properties xmlns:p="http://schemas.microsoft.com/office/2006/metadata/properties" xmlns:xsi="http://www.w3.org/2001/XMLSchema-instance" xmlns:pc="http://schemas.microsoft.com/office/infopath/2007/PartnerControls">
-  <documentManagement/>
-</p:properties>
+<?mso-contentType ?>
+<FormTemplates xmlns="http://schemas.microsoft.com/sharepoint/v3/contenttype/forms">
+  <Display>DocumentLibraryForm</Display>
+  <Edit>DocumentLibraryForm</Edit>
+  <New>DocumentLibraryForm</New>
+</FormTemplates>
 </file>
 
 <file path=customXml/itemProps1.xml><?xml version="1.0" encoding="utf-8"?>
-<ds:datastoreItem xmlns:ds="http://schemas.openxmlformats.org/officeDocument/2006/customXml" ds:itemID="{3D53AF73-02B6-4FAA-B822-5237969E7930}">
+<ds:datastoreItem xmlns:ds="http://schemas.openxmlformats.org/officeDocument/2006/customXml" ds:itemID="{49DC6958-FECD-4947-97BE-CA5707330548}">
   <ds:schemaRefs>
-    <ds:schemaRef ds:uri="http://schemas.microsoft.com/sharepoint/v3/contenttype/forms"/>
+    <ds:schemaRef ds:uri="http://purl.org/dc/terms/"/>
+    <ds:schemaRef ds:uri="http://schemas.openxmlformats.org/package/2006/metadata/core-properties"/>
+    <ds:schemaRef ds:uri="http://schemas.microsoft.com/office/2006/metadata/properties"/>
+    <ds:schemaRef ds:uri="http://www.w3.org/XML/1998/namespace"/>
+    <ds:schemaRef ds:uri="http://purl.org/dc/dcmitype/"/>
+    <ds:schemaRef ds:uri="http://schemas.microsoft.com/office/2006/documentManagement/types"/>
+    <ds:schemaRef ds:uri="http://purl.org/dc/elements/1.1/"/>
+    <ds:schemaRef ds:uri="http://schemas.microsoft.com/office/infopath/2007/PartnerControls"/>
+    <ds:schemaRef ds:uri="4cdce085-67ed-4783-8e7b-eaa90ede39bd"/>
+    <ds:schemaRef ds:uri="a1409aef-99c6-4ff9-9159-36b88da3359a"/>
   </ds:schemaRefs>
 </ds:datastoreItem>
 </file>
@@ -25897,18 +25914,9 @@
 </file>
 
 <file path=customXml/itemProps3.xml><?xml version="1.0" encoding="utf-8"?>
-<ds:datastoreItem xmlns:ds="http://schemas.openxmlformats.org/officeDocument/2006/customXml" ds:itemID="{49DC6958-FECD-4947-97BE-CA5707330548}">
+<ds:datastoreItem xmlns:ds="http://schemas.openxmlformats.org/officeDocument/2006/customXml" ds:itemID="{3D53AF73-02B6-4FAA-B822-5237969E7930}">
   <ds:schemaRefs>
-    <ds:schemaRef ds:uri="http://purl.org/dc/terms/"/>
-    <ds:schemaRef ds:uri="http://schemas.openxmlformats.org/package/2006/metadata/core-properties"/>
-    <ds:schemaRef ds:uri="http://schemas.microsoft.com/office/2006/metadata/properties"/>
-    <ds:schemaRef ds:uri="http://www.w3.org/XML/1998/namespace"/>
-    <ds:schemaRef ds:uri="http://purl.org/dc/dcmitype/"/>
-    <ds:schemaRef ds:uri="http://schemas.microsoft.com/office/2006/documentManagement/types"/>
-    <ds:schemaRef ds:uri="http://purl.org/dc/elements/1.1/"/>
-    <ds:schemaRef ds:uri="http://schemas.microsoft.com/office/infopath/2007/PartnerControls"/>
-    <ds:schemaRef ds:uri="4cdce085-67ed-4783-8e7b-eaa90ede39bd"/>
-    <ds:schemaRef ds:uri="a1409aef-99c6-4ff9-9159-36b88da3359a"/>
+    <ds:schemaRef ds:uri="http://schemas.microsoft.com/sharepoint/v3/contenttype/forms"/>
   </ds:schemaRefs>
 </ds:datastoreItem>
 </file>
</xml_diff>